<commit_message>
Update 20190828-Summary, learning time for DP.pptx
20190830
</commit_message>
<xml_diff>
--- a/Workspace0828/20190828-Summary, learning time for DP.pptx
+++ b/Workspace0828/20190828-Summary, learning time for DP.pptx
@@ -6,9 +6,13 @@
   </p:sldMasterIdLst>
   <p:sldIdLst>
     <p:sldId id="256" r:id="rId2"/>
-    <p:sldId id="257" r:id="rId3"/>
-    <p:sldId id="259" r:id="rId4"/>
-    <p:sldId id="260" r:id="rId5"/>
+    <p:sldId id="259" r:id="rId3"/>
+    <p:sldId id="261" r:id="rId4"/>
+    <p:sldId id="262" r:id="rId5"/>
+    <p:sldId id="263" r:id="rId6"/>
+    <p:sldId id="265" r:id="rId7"/>
+    <p:sldId id="266" r:id="rId8"/>
+    <p:sldId id="260" r:id="rId9"/>
   </p:sldIdLst>
   <p:sldSz cx="12192000" cy="6858000"/>
   <p:notesSz cx="6858000" cy="9144000"/>
@@ -490,6 +494,98 @@
 </p:sldLayout>
 </file>
 
+<file path=ppt/slideLayouts/slideLayout4.xml><?xml version="1.0" encoding="utf-8"?>
+<p:sldLayout xmlns:a="http://schemas.openxmlformats.org/drawingml/2006/main" xmlns:r="http://schemas.openxmlformats.org/officeDocument/2006/relationships" xmlns:p="http://schemas.openxmlformats.org/presentationml/2006/main" preserve="1" userDrawn="1">
+  <p:cSld name="2_标题和内容">
+    <p:spTree>
+      <p:nvGrpSpPr>
+        <p:cNvPr id="1" name=""/>
+        <p:cNvGrpSpPr/>
+        <p:nvPr/>
+      </p:nvGrpSpPr>
+      <p:grpSpPr>
+        <a:xfrm>
+          <a:off x="0" y="0"/>
+          <a:ext cx="0" cy="0"/>
+          <a:chOff x="0" y="0"/>
+          <a:chExt cx="0" cy="0"/>
+        </a:xfrm>
+      </p:grpSpPr>
+      <p:sp>
+        <p:nvSpPr>
+          <p:cNvPr id="3" name="内容占位符 2">
+            <a:extLst>
+              <a:ext uri="{FF2B5EF4-FFF2-40B4-BE49-F238E27FC236}">
+                <a16:creationId xmlns:a16="http://schemas.microsoft.com/office/drawing/2014/main" id="{E9F26946-007E-4D0B-9211-32F0543C84A2}"/>
+              </a:ext>
+            </a:extLst>
+          </p:cNvPr>
+          <p:cNvSpPr>
+            <a:spLocks noGrp="1"/>
+          </p:cNvSpPr>
+          <p:nvPr>
+            <p:ph idx="1"/>
+          </p:nvPr>
+        </p:nvSpPr>
+        <p:spPr>
+          <a:xfrm>
+            <a:off x="838200" y="365126"/>
+            <a:ext cx="10515600" cy="6290116"/>
+          </a:xfrm>
+        </p:spPr>
+        <p:txBody>
+          <a:bodyPr/>
+          <a:lstStyle/>
+          <a:p>
+            <a:pPr lvl="0"/>
+            <a:r>
+              <a:rPr lang="zh-CN" altLang="en-US" dirty="0"/>
+              <a:t>单击此处编辑母版文本样式</a:t>
+            </a:r>
+          </a:p>
+          <a:p>
+            <a:pPr lvl="1"/>
+            <a:r>
+              <a:rPr lang="zh-CN" altLang="en-US" dirty="0"/>
+              <a:t>二级</a:t>
+            </a:r>
+          </a:p>
+          <a:p>
+            <a:pPr lvl="2"/>
+            <a:r>
+              <a:rPr lang="zh-CN" altLang="en-US" dirty="0"/>
+              <a:t>三级</a:t>
+            </a:r>
+          </a:p>
+          <a:p>
+            <a:pPr lvl="3"/>
+            <a:r>
+              <a:rPr lang="zh-CN" altLang="en-US" dirty="0"/>
+              <a:t>四级</a:t>
+            </a:r>
+          </a:p>
+          <a:p>
+            <a:pPr lvl="4"/>
+            <a:r>
+              <a:rPr lang="zh-CN" altLang="en-US" dirty="0"/>
+              <a:t>五级</a:t>
+            </a:r>
+          </a:p>
+        </p:txBody>
+      </p:sp>
+    </p:spTree>
+    <p:extLst>
+      <p:ext uri="{BB962C8B-B14F-4D97-AF65-F5344CB8AC3E}">
+        <p14:creationId xmlns:p14="http://schemas.microsoft.com/office/powerpoint/2010/main" val="2663231015"/>
+      </p:ext>
+    </p:extLst>
+  </p:cSld>
+  <p:clrMapOvr>
+    <a:masterClrMapping/>
+  </p:clrMapOvr>
+</p:sldLayout>
+</file>
+
 <file path=ppt/slideMasters/slideMaster1.xml><?xml version="1.0" encoding="utf-8"?>
 <p:sldMaster xmlns:a="http://schemas.openxmlformats.org/drawingml/2006/main" xmlns:r="http://schemas.openxmlformats.org/officeDocument/2006/relationships" xmlns:p="http://schemas.openxmlformats.org/presentationml/2006/main">
   <p:cSld>
@@ -629,6 +725,7 @@
     <p:sldLayoutId id="2147483649" r:id="rId1"/>
     <p:sldLayoutId id="2147483650" r:id="rId2"/>
     <p:sldLayoutId id="2147483665" r:id="rId3"/>
+    <p:sldLayoutId id="2147483666" r:id="rId4"/>
   </p:sldLayoutIdLst>
   <p:txStyles>
     <p:titleStyle>
@@ -1031,10 +1128,56 @@
       </p:grpSpPr>
       <p:sp>
         <p:nvSpPr>
-          <p:cNvPr id="2" name="标题 1">
-            <a:extLst>
-              <a:ext uri="{FF2B5EF4-FFF2-40B4-BE49-F238E27FC236}">
-                <a16:creationId xmlns:a16="http://schemas.microsoft.com/office/drawing/2014/main" id="{25ABB033-CFBF-48F9-A2EA-61C3BADDD0C8}"/>
+          <p:cNvPr id="2" name="内容占位符 1">
+            <a:extLst>
+              <a:ext uri="{FF2B5EF4-FFF2-40B4-BE49-F238E27FC236}">
+                <a16:creationId xmlns:a16="http://schemas.microsoft.com/office/drawing/2014/main" id="{2E91B4D8-FF40-4758-A3D3-C0444B9F9216}"/>
+              </a:ext>
+            </a:extLst>
+          </p:cNvPr>
+          <p:cNvSpPr>
+            <a:spLocks noGrp="1"/>
+          </p:cNvSpPr>
+          <p:nvPr>
+            <p:ph idx="1"/>
+          </p:nvPr>
+        </p:nvSpPr>
+        <p:spPr>
+          <a:xfrm>
+            <a:off x="6096000" y="1510748"/>
+            <a:ext cx="5257800" cy="2951185"/>
+          </a:xfrm>
+        </p:spPr>
+        <p:txBody>
+          <a:bodyPr anchor="ctr">
+            <a:normAutofit/>
+          </a:bodyPr>
+          <a:lstStyle/>
+          <a:p>
+            <a:r>
+              <a:rPr lang="zh-CN" altLang="en-US" dirty="0"/>
+              <a:t>强调</a:t>
+            </a:r>
+            <a:r>
+              <a:rPr lang="en-US" altLang="zh-CN" dirty="0"/>
+              <a:t>new paradigm, analog computing,</a:t>
+            </a:r>
+          </a:p>
+          <a:p>
+            <a:r>
+              <a:rPr lang="en-US" altLang="zh-CN" dirty="0"/>
+              <a:t>Readout: machine learning on digital computers.</a:t>
+            </a:r>
+            <a:endParaRPr lang="zh-CN" altLang="en-US" dirty="0"/>
+          </a:p>
+        </p:txBody>
+      </p:sp>
+      <p:sp>
+        <p:nvSpPr>
+          <p:cNvPr id="3" name="标题 2">
+            <a:extLst>
+              <a:ext uri="{FF2B5EF4-FFF2-40B4-BE49-F238E27FC236}">
+                <a16:creationId xmlns:a16="http://schemas.microsoft.com/office/drawing/2014/main" id="{5000C4A3-7B3E-4B13-BC32-034C7644D20C}"/>
               </a:ext>
             </a:extLst>
           </p:cNvPr>
@@ -1045,58 +1188,284 @@
             <p:ph type="title"/>
           </p:nvPr>
         </p:nvSpPr>
+        <p:spPr/>
+        <p:txBody>
+          <a:bodyPr/>
+          <a:lstStyle/>
+          <a:p>
+            <a:r>
+              <a:rPr lang="zh-CN" altLang="en-US" dirty="0"/>
+              <a:t>水库计算</a:t>
+            </a:r>
+          </a:p>
+        </p:txBody>
+      </p:sp>
+      <p:pic>
+        <p:nvPicPr>
+          <p:cNvPr id="4" name="图片 3">
+            <a:extLst>
+              <a:ext uri="{FF2B5EF4-FFF2-40B4-BE49-F238E27FC236}">
+                <a16:creationId xmlns:a16="http://schemas.microsoft.com/office/drawing/2014/main" id="{F5D7BC58-8AC7-4585-9756-A5B8A8F97E57}"/>
+              </a:ext>
+            </a:extLst>
+          </p:cNvPr>
+          <p:cNvPicPr>
+            <a:picLocks noChangeAspect="1"/>
+          </p:cNvPicPr>
+          <p:nvPr/>
+        </p:nvPicPr>
+        <p:blipFill>
+          <a:blip r:embed="rId2"/>
+          <a:stretch>
+            <a:fillRect/>
+          </a:stretch>
+        </p:blipFill>
         <p:spPr>
           <a:xfrm>
-            <a:off x="838200" y="365126"/>
-            <a:ext cx="10515600" cy="946840"/>
+            <a:off x="982134" y="1510748"/>
+            <a:ext cx="4867759" cy="2951185"/>
           </a:xfrm>
+          <a:prstGeom prst="rect">
+            <a:avLst/>
+          </a:prstGeom>
         </p:spPr>
-        <p:txBody>
-          <a:bodyPr/>
-          <a:lstStyle/>
-          <a:p>
-            <a:r>
-              <a:rPr lang="en-US" altLang="zh-CN" dirty="0"/>
-              <a:t>Reference</a:t>
-            </a:r>
-            <a:endParaRPr lang="zh-CN" altLang="en-US" dirty="0"/>
-          </a:p>
-        </p:txBody>
-      </p:sp>
-      <p:sp>
-        <p:nvSpPr>
-          <p:cNvPr id="3" name="内容占位符 2">
-            <a:extLst>
-              <a:ext uri="{FF2B5EF4-FFF2-40B4-BE49-F238E27FC236}">
-                <a16:creationId xmlns:a16="http://schemas.microsoft.com/office/drawing/2014/main" id="{695695B8-C60A-47C9-A102-41505F07B651}"/>
-              </a:ext>
-            </a:extLst>
-          </p:cNvPr>
-          <p:cNvSpPr>
-            <a:spLocks noGrp="1"/>
-          </p:cNvSpPr>
-          <p:nvPr>
-            <p:ph idx="1"/>
-          </p:nvPr>
+      </p:pic>
+      <p:sp>
+        <p:nvSpPr>
+          <p:cNvPr id="5" name="文本框 4">
+            <a:extLst>
+              <a:ext uri="{FF2B5EF4-FFF2-40B4-BE49-F238E27FC236}">
+                <a16:creationId xmlns:a16="http://schemas.microsoft.com/office/drawing/2014/main" id="{B6CEC18E-118F-4307-A415-9C274E748951}"/>
+              </a:ext>
+            </a:extLst>
+          </p:cNvPr>
+          <p:cNvSpPr txBox="1"/>
+          <p:nvPr/>
         </p:nvSpPr>
         <p:spPr>
           <a:xfrm>
-            <a:off x="4047066" y="1510748"/>
-            <a:ext cx="7306733" cy="5144494"/>
+            <a:off x="4405209" y="3200400"/>
+            <a:ext cx="1567737" cy="307777"/>
           </a:xfrm>
+          <a:prstGeom prst="rect">
+            <a:avLst/>
+          </a:prstGeom>
+          <a:noFill/>
         </p:spPr>
         <p:txBody>
-          <a:bodyPr/>
-          <a:lstStyle/>
-          <a:p>
-            <a:endParaRPr lang="zh-CN" altLang="en-US" dirty="0"/>
+          <a:bodyPr wrap="none" rtlCol="0">
+            <a:spAutoFit/>
+          </a:bodyPr>
+          <a:lstStyle/>
+          <a:p>
+            <a:pPr algn="l"/>
+            <a:r>
+              <a:rPr lang="en-US" altLang="zh-CN" sz="1400" dirty="0">
+                <a:latin typeface="微软雅黑" panose="020B0503020204020204" pitchFamily="34" charset="-122"/>
+                <a:ea typeface="微软雅黑" panose="020B0503020204020204" pitchFamily="34" charset="-122"/>
+              </a:rPr>
+              <a:t>Micro processor</a:t>
+            </a:r>
+            <a:endParaRPr lang="zh-CN" altLang="en-US" sz="1400" dirty="0">
+              <a:latin typeface="微软雅黑" panose="020B0503020204020204" pitchFamily="34" charset="-122"/>
+              <a:ea typeface="微软雅黑" panose="020B0503020204020204" pitchFamily="34" charset="-122"/>
+            </a:endParaRPr>
+          </a:p>
+        </p:txBody>
+      </p:sp>
+      <p:sp>
+        <p:nvSpPr>
+          <p:cNvPr id="6" name="文本框 5">
+            <a:extLst>
+              <a:ext uri="{FF2B5EF4-FFF2-40B4-BE49-F238E27FC236}">
+                <a16:creationId xmlns:a16="http://schemas.microsoft.com/office/drawing/2014/main" id="{C6BBF7A6-BDBC-4193-8E1B-F39FD71E4D63}"/>
+              </a:ext>
+            </a:extLst>
+          </p:cNvPr>
+          <p:cNvSpPr txBox="1"/>
+          <p:nvPr/>
+        </p:nvSpPr>
+        <p:spPr>
+          <a:xfrm>
+            <a:off x="1134533" y="4766733"/>
+            <a:ext cx="184731" cy="369332"/>
+          </a:xfrm>
+          <a:prstGeom prst="rect">
+            <a:avLst/>
+          </a:prstGeom>
+          <a:noFill/>
+        </p:spPr>
+        <p:txBody>
+          <a:bodyPr wrap="none" rtlCol="0">
+            <a:spAutoFit/>
+          </a:bodyPr>
+          <a:lstStyle/>
+          <a:p>
+            <a:pPr algn="l"/>
+            <a:endParaRPr lang="zh-CN" altLang="en-US" dirty="0">
+              <a:latin typeface="微软雅黑" panose="020B0503020204020204" pitchFamily="34" charset="-122"/>
+              <a:ea typeface="微软雅黑" panose="020B0503020204020204" pitchFamily="34" charset="-122"/>
+            </a:endParaRPr>
+          </a:p>
+        </p:txBody>
+      </p:sp>
+      <p:sp>
+        <p:nvSpPr>
+          <p:cNvPr id="8" name="文本框 7">
+            <a:extLst>
+              <a:ext uri="{FF2B5EF4-FFF2-40B4-BE49-F238E27FC236}">
+                <a16:creationId xmlns:a16="http://schemas.microsoft.com/office/drawing/2014/main" id="{FE499744-4FA8-4A2D-AC6F-71669539D026}"/>
+              </a:ext>
+            </a:extLst>
+          </p:cNvPr>
+          <p:cNvSpPr txBox="1"/>
+          <p:nvPr/>
+        </p:nvSpPr>
+        <p:spPr>
+          <a:xfrm>
+            <a:off x="365186" y="4660715"/>
+            <a:ext cx="11125200" cy="1920526"/>
+          </a:xfrm>
+          <a:prstGeom prst="rect">
+            <a:avLst/>
+          </a:prstGeom>
+          <a:noFill/>
+        </p:spPr>
+        <p:txBody>
+          <a:bodyPr wrap="square" rtlCol="0">
+            <a:spAutoFit/>
+          </a:bodyPr>
+          <a:lstStyle/>
+          <a:p>
+            <a:pPr marL="228600" indent="-228600">
+              <a:lnSpc>
+                <a:spcPct val="90000"/>
+              </a:lnSpc>
+              <a:spcBef>
+                <a:spcPts val="1000"/>
+              </a:spcBef>
+              <a:buFont typeface="Arial" panose="020B0604020202020204" pitchFamily="34" charset="0"/>
+              <a:buChar char="•"/>
+            </a:pPr>
+            <a:r>
+              <a:rPr lang="en-US" altLang="zh-CN" sz="2800" dirty="0">
+                <a:latin typeface="微软雅黑" panose="020B0503020204020204" pitchFamily="34" charset="-122"/>
+                <a:ea typeface="微软雅黑" panose="020B0503020204020204" pitchFamily="34" charset="-122"/>
+              </a:rPr>
+              <a:t>We show </a:t>
+            </a:r>
+            <a:r>
+              <a:rPr lang="en-US" altLang="zh-CN" sz="2800" dirty="0">
+                <a:solidFill>
+                  <a:srgbClr val="FF0000"/>
+                </a:solidFill>
+                <a:latin typeface="微软雅黑" panose="020B0503020204020204" pitchFamily="34" charset="-122"/>
+                <a:ea typeface="微软雅黑" panose="020B0503020204020204" pitchFamily="34" charset="-122"/>
+              </a:rPr>
+              <a:t>how</a:t>
+            </a:r>
+            <a:r>
+              <a:rPr lang="en-US" altLang="zh-CN" sz="2800" dirty="0">
+                <a:latin typeface="微软雅黑" panose="020B0503020204020204" pitchFamily="34" charset="-122"/>
+                <a:ea typeface="微软雅黑" panose="020B0503020204020204" pitchFamily="34" charset="-122"/>
+              </a:rPr>
+              <a:t> passive reservoir computing chips </a:t>
+            </a:r>
+            <a:r>
+              <a:rPr lang="en-US" altLang="zh-CN" sz="2800" dirty="0">
+                <a:solidFill>
+                  <a:srgbClr val="FF0000"/>
+                </a:solidFill>
+                <a:latin typeface="微软雅黑" panose="020B0503020204020204" pitchFamily="34" charset="-122"/>
+                <a:ea typeface="微软雅黑" panose="020B0503020204020204" pitchFamily="34" charset="-122"/>
+              </a:rPr>
+              <a:t>can be used </a:t>
+            </a:r>
+            <a:r>
+              <a:rPr lang="en-US" altLang="zh-CN" sz="2800" dirty="0">
+                <a:latin typeface="微软雅黑" panose="020B0503020204020204" pitchFamily="34" charset="-122"/>
+                <a:ea typeface="微软雅黑" panose="020B0503020204020204" pitchFamily="34" charset="-122"/>
+              </a:rPr>
+              <a:t>to perform a variety of tasks (bit level tasks, nonlinear dispersion compensation, etc.) at high speeds and low power consumption.</a:t>
+            </a:r>
+          </a:p>
+          <a:p>
+            <a:pPr algn="l"/>
+            <a:endParaRPr lang="zh-CN" altLang="en-US" dirty="0">
+              <a:latin typeface="微软雅黑" panose="020B0503020204020204" pitchFamily="34" charset="-122"/>
+              <a:ea typeface="微软雅黑" panose="020B0503020204020204" pitchFamily="34" charset="-122"/>
+            </a:endParaRPr>
+          </a:p>
+        </p:txBody>
+      </p:sp>
+      <p:sp>
+        <p:nvSpPr>
+          <p:cNvPr id="9" name="文本框 8">
+            <a:extLst>
+              <a:ext uri="{FF2B5EF4-FFF2-40B4-BE49-F238E27FC236}">
+                <a16:creationId xmlns:a16="http://schemas.microsoft.com/office/drawing/2014/main" id="{4E8E595D-FA49-494C-8514-C8C27C83689E}"/>
+              </a:ext>
+            </a:extLst>
+          </p:cNvPr>
+          <p:cNvSpPr txBox="1"/>
+          <p:nvPr/>
+        </p:nvSpPr>
+        <p:spPr>
+          <a:xfrm>
+            <a:off x="419067" y="4316692"/>
+            <a:ext cx="5993892" cy="397032"/>
+          </a:xfrm>
+          <a:prstGeom prst="rect">
+            <a:avLst/>
+          </a:prstGeom>
+          <a:noFill/>
+        </p:spPr>
+        <p:txBody>
+          <a:bodyPr wrap="square" rtlCol="0">
+            <a:spAutoFit/>
+          </a:bodyPr>
+          <a:lstStyle/>
+          <a:p>
+            <a:pPr>
+              <a:lnSpc>
+                <a:spcPct val="90000"/>
+              </a:lnSpc>
+              <a:spcBef>
+                <a:spcPts val="1000"/>
+              </a:spcBef>
+            </a:pPr>
+            <a:r>
+              <a:rPr lang="en-US" altLang="zh-CN" sz="1100" dirty="0">
+                <a:latin typeface="微软雅黑" panose="020B0503020204020204" pitchFamily="34" charset="-122"/>
+                <a:ea typeface="微软雅黑" panose="020B0503020204020204" pitchFamily="34" charset="-122"/>
+              </a:rPr>
+              <a:t>(</a:t>
+            </a:r>
+            <a:r>
+              <a:rPr lang="en-US" altLang="zh-CN" sz="1100" dirty="0" err="1">
+                <a:latin typeface="微软雅黑" panose="020B0503020204020204" pitchFamily="34" charset="-122"/>
+                <a:ea typeface="微软雅黑" panose="020B0503020204020204" pitchFamily="34" charset="-122"/>
+              </a:rPr>
+              <a:t>Katumba</a:t>
+            </a:r>
+            <a:r>
+              <a:rPr lang="en-US" altLang="zh-CN" sz="1100" dirty="0">
+                <a:latin typeface="微软雅黑" panose="020B0503020204020204" pitchFamily="34" charset="-122"/>
+                <a:ea typeface="微软雅黑" panose="020B0503020204020204" pitchFamily="34" charset="-122"/>
+              </a:rPr>
+              <a:t> et al., Neuromorphic Computing Based on Silicon Photonics and Reservoir Computing, IEEE Journal of Selected Topics in Quantum Electronics, 2018)</a:t>
+            </a:r>
+            <a:endParaRPr lang="zh-CN" altLang="en-US" sz="1100" dirty="0">
+              <a:latin typeface="微软雅黑" panose="020B0503020204020204" pitchFamily="34" charset="-122"/>
+              <a:ea typeface="微软雅黑" panose="020B0503020204020204" pitchFamily="34" charset="-122"/>
+            </a:endParaRPr>
           </a:p>
         </p:txBody>
       </p:sp>
     </p:spTree>
     <p:extLst>
       <p:ext uri="{BB962C8B-B14F-4D97-AF65-F5344CB8AC3E}">
-        <p14:creationId xmlns:p14="http://schemas.microsoft.com/office/powerpoint/2010/main" val="3366925790"/>
+        <p14:creationId xmlns:p14="http://schemas.microsoft.com/office/powerpoint/2010/main" val="2394345314"/>
       </p:ext>
     </p:extLst>
   </p:cSld>
@@ -1128,7 +1497,7 @@
           <p:cNvPr id="2" name="内容占位符 1">
             <a:extLst>
               <a:ext uri="{FF2B5EF4-FFF2-40B4-BE49-F238E27FC236}">
-                <a16:creationId xmlns:a16="http://schemas.microsoft.com/office/drawing/2014/main" id="{2E91B4D8-FF40-4758-A3D3-C0444B9F9216}"/>
+                <a16:creationId xmlns:a16="http://schemas.microsoft.com/office/drawing/2014/main" id="{2C06F022-A649-43C4-BAB8-E9CD8118123F}"/>
               </a:ext>
             </a:extLst>
           </p:cNvPr>
@@ -1139,33 +1508,289 @@
             <p:ph idx="1"/>
           </p:nvPr>
         </p:nvSpPr>
+        <p:spPr/>
+        <p:txBody>
+          <a:bodyPr/>
+          <a:lstStyle/>
+          <a:p>
+            <a:r>
+              <a:rPr lang="en-US" altLang="zh-CN" dirty="0"/>
+              <a:t>Analog computing paradigm</a:t>
+            </a:r>
+          </a:p>
+          <a:p>
+            <a:pPr lvl="1"/>
+            <a:r>
+              <a:rPr lang="en-US" altLang="zh-CN" dirty="0"/>
+              <a:t>a promising implementation, relies on certain physical systems and evolution of the internal state.</a:t>
+            </a:r>
+          </a:p>
+          <a:p>
+            <a:pPr lvl="1"/>
+            <a:r>
+              <a:rPr lang="en-US" altLang="zh-CN" dirty="0"/>
+              <a:t>typically coupled to a readout system to guide the evolution of the system state towards a solution. (transform the observed physical signal into  interpretation by digital computers)</a:t>
+            </a:r>
+          </a:p>
+          <a:p>
+            <a:r>
+              <a:rPr lang="en-US" altLang="zh-CN" dirty="0"/>
+              <a:t>Machine learning</a:t>
+            </a:r>
+          </a:p>
+          <a:p>
+            <a:pPr lvl="1"/>
+            <a:r>
+              <a:rPr lang="en-US" altLang="zh-CN" dirty="0"/>
+              <a:t>applied in the readout system to teach computer systems how to perform (or </a:t>
+            </a:r>
+            <a:r>
+              <a:rPr lang="en-US" altLang="zh-CN" dirty="0" err="1"/>
+              <a:t>interpretate</a:t>
+            </a:r>
+            <a:r>
+              <a:rPr lang="en-US" altLang="zh-CN" dirty="0"/>
+              <a:t>) complex tasks.</a:t>
+            </a:r>
+          </a:p>
+          <a:p>
+            <a:pPr lvl="1"/>
+            <a:r>
+              <a:rPr lang="en-US" altLang="zh-CN" dirty="0"/>
+              <a:t>calculated in the electrical domain</a:t>
+            </a:r>
+          </a:p>
+          <a:p>
+            <a:endParaRPr lang="en-US" altLang="zh-CN" dirty="0"/>
+          </a:p>
+        </p:txBody>
+      </p:sp>
+    </p:spTree>
+    <p:extLst>
+      <p:ext uri="{BB962C8B-B14F-4D97-AF65-F5344CB8AC3E}">
+        <p14:creationId xmlns:p14="http://schemas.microsoft.com/office/powerpoint/2010/main" val="1750909353"/>
+      </p:ext>
+    </p:extLst>
+  </p:cSld>
+  <p:clrMapOvr>
+    <a:masterClrMapping/>
+  </p:clrMapOvr>
+</p:sld>
+</file>
+
+<file path=ppt/slides/slide4.xml><?xml version="1.0" encoding="utf-8"?>
+<p:sld xmlns:a="http://schemas.openxmlformats.org/drawingml/2006/main" xmlns:r="http://schemas.openxmlformats.org/officeDocument/2006/relationships" xmlns:p="http://schemas.openxmlformats.org/presentationml/2006/main">
+  <p:cSld>
+    <p:spTree>
+      <p:nvGrpSpPr>
+        <p:cNvPr id="1" name=""/>
+        <p:cNvGrpSpPr/>
+        <p:nvPr/>
+      </p:nvGrpSpPr>
+      <p:grpSpPr>
+        <a:xfrm>
+          <a:off x="0" y="0"/>
+          <a:ext cx="0" cy="0"/>
+          <a:chOff x="0" y="0"/>
+          <a:chExt cx="0" cy="0"/>
+        </a:xfrm>
+      </p:grpSpPr>
+      <p:sp>
+        <p:nvSpPr>
+          <p:cNvPr id="2" name="内容占位符 1">
+            <a:extLst>
+              <a:ext uri="{FF2B5EF4-FFF2-40B4-BE49-F238E27FC236}">
+                <a16:creationId xmlns:a16="http://schemas.microsoft.com/office/drawing/2014/main" id="{9300A6EF-FCD2-4854-B35C-8CA660EEF078}"/>
+              </a:ext>
+            </a:extLst>
+          </p:cNvPr>
+          <p:cNvSpPr>
+            <a:spLocks noGrp="1"/>
+          </p:cNvSpPr>
+          <p:nvPr>
+            <p:ph idx="1"/>
+          </p:nvPr>
+        </p:nvSpPr>
+        <p:spPr/>
+        <p:txBody>
+          <a:bodyPr/>
+          <a:lstStyle/>
+          <a:p>
+            <a:r>
+              <a:rPr lang="en-US" altLang="zh-CN" dirty="0"/>
+              <a:t>Training Optical Readouts</a:t>
+            </a:r>
+          </a:p>
+          <a:p>
+            <a:pPr lvl="1"/>
+            <a:r>
+              <a:rPr lang="en-US" altLang="zh-CN" dirty="0"/>
+              <a:t>separate high-photodetectors</a:t>
+            </a:r>
+          </a:p>
+          <a:p>
+            <a:pPr lvl="2"/>
+            <a:r>
+              <a:rPr lang="en-US" altLang="zh-CN" dirty="0"/>
+              <a:t>photodetectors tend to be costly due to footprint</a:t>
+            </a:r>
+          </a:p>
+          <a:p>
+            <a:pPr lvl="2"/>
+            <a:r>
+              <a:rPr lang="en-US" altLang="zh-CN" dirty="0"/>
+              <a:t>can only measure the intensities</a:t>
+            </a:r>
+          </a:p>
+          <a:p>
+            <a:pPr lvl="1"/>
+            <a:r>
+              <a:rPr lang="en-US" altLang="zh-CN" dirty="0"/>
+              <a:t>trains the weights based on simulation</a:t>
+            </a:r>
+          </a:p>
+          <a:p>
+            <a:pPr lvl="2"/>
+            <a:r>
+              <a:rPr lang="en-US" altLang="zh-CN" dirty="0"/>
+              <a:t>fabrication tolerances</a:t>
+            </a:r>
+          </a:p>
+          <a:p>
+            <a:pPr lvl="1"/>
+            <a:r>
+              <a:rPr lang="en-US" altLang="zh-CN" dirty="0"/>
+              <a:t>pretraining-retraining</a:t>
+            </a:r>
+          </a:p>
+          <a:p>
+            <a:pPr lvl="2"/>
+            <a:r>
+              <a:rPr lang="en-US" altLang="zh-CN" dirty="0"/>
+              <a:t>fabrication tolerances</a:t>
+            </a:r>
+          </a:p>
+          <a:p>
+            <a:pPr lvl="1"/>
+            <a:r>
+              <a:rPr lang="en-US" altLang="zh-CN" dirty="0"/>
+              <a:t>single high-photodetectors(prefer)</a:t>
+            </a:r>
+          </a:p>
+          <a:p>
+            <a:pPr lvl="2"/>
+            <a:r>
+              <a:rPr lang="en-US" altLang="zh-CN" dirty="0"/>
+              <a:t>does take some time</a:t>
+            </a:r>
+          </a:p>
+          <a:p>
+            <a:pPr lvl="2"/>
+            <a:r>
+              <a:rPr lang="en-US" altLang="zh-CN" dirty="0"/>
+              <a:t>still requires external microprocessor</a:t>
+            </a:r>
+          </a:p>
+          <a:p>
+            <a:endParaRPr lang="zh-CN" altLang="en-US" dirty="0"/>
+          </a:p>
+        </p:txBody>
+      </p:sp>
+    </p:spTree>
+    <p:extLst>
+      <p:ext uri="{BB962C8B-B14F-4D97-AF65-F5344CB8AC3E}">
+        <p14:creationId xmlns:p14="http://schemas.microsoft.com/office/powerpoint/2010/main" val="2544160485"/>
+      </p:ext>
+    </p:extLst>
+  </p:cSld>
+  <p:clrMapOvr>
+    <a:masterClrMapping/>
+  </p:clrMapOvr>
+</p:sld>
+</file>
+
+<file path=ppt/slides/slide5.xml><?xml version="1.0" encoding="utf-8"?>
+<p:sld xmlns:a="http://schemas.openxmlformats.org/drawingml/2006/main" xmlns:r="http://schemas.openxmlformats.org/officeDocument/2006/relationships" xmlns:p="http://schemas.openxmlformats.org/presentationml/2006/main">
+  <p:cSld>
+    <p:spTree>
+      <p:nvGrpSpPr>
+        <p:cNvPr id="1" name=""/>
+        <p:cNvGrpSpPr/>
+        <p:nvPr/>
+      </p:nvGrpSpPr>
+      <p:grpSpPr>
+        <a:xfrm>
+          <a:off x="0" y="0"/>
+          <a:ext cx="0" cy="0"/>
+          <a:chOff x="0" y="0"/>
+          <a:chExt cx="0" cy="0"/>
+        </a:xfrm>
+      </p:grpSpPr>
+      <p:sp>
+        <p:nvSpPr>
+          <p:cNvPr id="2" name="内容占位符 1">
+            <a:extLst>
+              <a:ext uri="{FF2B5EF4-FFF2-40B4-BE49-F238E27FC236}">
+                <a16:creationId xmlns:a16="http://schemas.microsoft.com/office/drawing/2014/main" id="{F8AEE3F9-E9BF-4665-9F39-C63D9C256827}"/>
+              </a:ext>
+            </a:extLst>
+          </p:cNvPr>
+          <p:cNvSpPr>
+            <a:spLocks noGrp="1"/>
+          </p:cNvSpPr>
+          <p:nvPr>
+            <p:ph idx="1"/>
+          </p:nvPr>
+        </p:nvSpPr>
         <p:spPr>
           <a:xfrm>
-            <a:off x="6096000" y="1510748"/>
-            <a:ext cx="5257800" cy="2951185"/>
+            <a:off x="7078133" y="1535661"/>
+            <a:ext cx="4275667" cy="2731537"/>
           </a:xfrm>
         </p:spPr>
         <p:txBody>
-          <a:bodyPr anchor="ctr">
-            <a:normAutofit/>
+          <a:bodyPr anchor="t">
+            <a:normAutofit fontScale="92500" lnSpcReduction="10000"/>
           </a:bodyPr>
           <a:lstStyle/>
           <a:p>
             <a:r>
-              <a:rPr lang="zh-CN" altLang="en-US" dirty="0"/>
-              <a:t>强调</a:t>
-            </a:r>
-            <a:r>
-              <a:rPr lang="en-US" altLang="zh-CN" dirty="0"/>
-              <a:t>new paradigm, analog computing,</a:t>
-            </a:r>
-          </a:p>
-          <a:p>
-            <a:r>
-              <a:rPr lang="en-US" altLang="zh-CN" dirty="0"/>
-              <a:t>Readout: machine learning on digital computers.</a:t>
-            </a:r>
-            <a:endParaRPr lang="zh-CN" altLang="en-US" dirty="0"/>
+              <a:rPr lang="en-US" altLang="zh-CN" sz="2000" dirty="0"/>
+              <a:t>monochromatic plane wave</a:t>
+            </a:r>
+          </a:p>
+          <a:p>
+            <a:r>
+              <a:rPr lang="en-US" altLang="zh-CN" sz="2000" dirty="0"/>
+              <a:t>pillar: randomly generated, kept fixed</a:t>
+            </a:r>
+          </a:p>
+          <a:p>
+            <a:r>
+              <a:rPr lang="en-US" altLang="zh-CN" sz="2000" dirty="0"/>
+              <a:t>simulation: cells and pillar </a:t>
+            </a:r>
+            <a:r>
+              <a:rPr lang="en-US" altLang="zh-CN" sz="2000" dirty="0" err="1"/>
+              <a:t>scatterer</a:t>
+            </a:r>
+            <a:r>
+              <a:rPr lang="en-US" altLang="zh-CN" sz="2000" dirty="0"/>
+              <a:t> (by setting some rules)</a:t>
+            </a:r>
+          </a:p>
+          <a:p>
+            <a:r>
+              <a:rPr lang="en-US" altLang="zh-CN" sz="2000" dirty="0"/>
+              <a:t>fast and energy efficiency: when running models (not training)</a:t>
+            </a:r>
+          </a:p>
+          <a:p>
+            <a:r>
+              <a:rPr lang="en-US" altLang="zh-CN" sz="2000" dirty="0"/>
+              <a:t>application: high throughput label-free cell sorting</a:t>
+            </a:r>
+            <a:endParaRPr lang="zh-CN" altLang="en-US" sz="2000" dirty="0"/>
           </a:p>
         </p:txBody>
       </p:sp>
@@ -1174,7 +1799,7 @@
           <p:cNvPr id="3" name="标题 2">
             <a:extLst>
               <a:ext uri="{FF2B5EF4-FFF2-40B4-BE49-F238E27FC236}">
-                <a16:creationId xmlns:a16="http://schemas.microsoft.com/office/drawing/2014/main" id="{5000C4A3-7B3E-4B13-BC32-034C7644D20C}"/>
+                <a16:creationId xmlns:a16="http://schemas.microsoft.com/office/drawing/2014/main" id="{9B2BB77C-3930-4B81-9EB2-290F9AC60EDD}"/>
               </a:ext>
             </a:extLst>
           </p:cNvPr>
@@ -1191,18 +1816,77 @@
           <a:lstStyle/>
           <a:p>
             <a:r>
-              <a:rPr lang="zh-CN" altLang="en-US" dirty="0"/>
-              <a:t>水库计算</a:t>
-            </a:r>
+              <a:rPr lang="en-US" altLang="zh-CN" dirty="0"/>
+              <a:t>Pillar </a:t>
+            </a:r>
+            <a:r>
+              <a:rPr lang="en-US" altLang="zh-CN" dirty="0" err="1"/>
+              <a:t>scatterer</a:t>
+            </a:r>
+            <a:r>
+              <a:rPr lang="en-US" altLang="zh-CN" dirty="0"/>
+              <a:t> paradigm</a:t>
+            </a:r>
+            <a:endParaRPr lang="zh-CN" altLang="en-US" dirty="0"/>
+          </a:p>
+        </p:txBody>
+      </p:sp>
+      <p:sp>
+        <p:nvSpPr>
+          <p:cNvPr id="7" name="文本框 6">
+            <a:extLst>
+              <a:ext uri="{FF2B5EF4-FFF2-40B4-BE49-F238E27FC236}">
+                <a16:creationId xmlns:a16="http://schemas.microsoft.com/office/drawing/2014/main" id="{72B8AACB-74D7-4403-B934-4A8ACB476C69}"/>
+              </a:ext>
+            </a:extLst>
+          </p:cNvPr>
+          <p:cNvSpPr txBox="1"/>
+          <p:nvPr/>
+        </p:nvSpPr>
+        <p:spPr>
+          <a:xfrm>
+            <a:off x="234831" y="5450456"/>
+            <a:ext cx="6633387" cy="757130"/>
+          </a:xfrm>
+          <a:prstGeom prst="rect">
+            <a:avLst/>
+          </a:prstGeom>
+          <a:noFill/>
+        </p:spPr>
+        <p:txBody>
+          <a:bodyPr wrap="square" rtlCol="0">
+            <a:spAutoFit/>
+          </a:bodyPr>
+          <a:lstStyle/>
+          <a:p>
+            <a:pPr algn="l">
+              <a:lnSpc>
+                <a:spcPct val="90000"/>
+              </a:lnSpc>
+              <a:spcBef>
+                <a:spcPts val="1000"/>
+              </a:spcBef>
+            </a:pPr>
+            <a:r>
+              <a:rPr lang="en-US" altLang="zh-CN" sz="2400" dirty="0">
+                <a:latin typeface="微软雅黑" panose="020B0503020204020204" pitchFamily="34" charset="-122"/>
+                <a:ea typeface="微软雅黑" panose="020B0503020204020204" pitchFamily="34" charset="-122"/>
+              </a:rPr>
+              <a:t>Normal cells and cancer cells form two clusters after calculating weighted sum.</a:t>
+            </a:r>
+            <a:endParaRPr lang="zh-CN" altLang="en-US" sz="2400" dirty="0">
+              <a:latin typeface="微软雅黑" panose="020B0503020204020204" pitchFamily="34" charset="-122"/>
+              <a:ea typeface="微软雅黑" panose="020B0503020204020204" pitchFamily="34" charset="-122"/>
+            </a:endParaRPr>
           </a:p>
         </p:txBody>
       </p:sp>
       <p:pic>
         <p:nvPicPr>
-          <p:cNvPr id="4" name="图片 3">
-            <a:extLst>
-              <a:ext uri="{FF2B5EF4-FFF2-40B4-BE49-F238E27FC236}">
-                <a16:creationId xmlns:a16="http://schemas.microsoft.com/office/drawing/2014/main" id="{F5D7BC58-8AC7-4585-9756-A5B8A8F97E57}"/>
+          <p:cNvPr id="8" name="图片 7">
+            <a:extLst>
+              <a:ext uri="{FF2B5EF4-FFF2-40B4-BE49-F238E27FC236}">
+                <a16:creationId xmlns:a16="http://schemas.microsoft.com/office/drawing/2014/main" id="{E2A1EB83-0E31-4B2E-8120-5C9A546F4E9B}"/>
               </a:ext>
             </a:extLst>
           </p:cNvPr>
@@ -1219,63 +1903,50 @@
         </p:blipFill>
         <p:spPr>
           <a:xfrm>
-            <a:off x="982134" y="1510748"/>
-            <a:ext cx="4867759" cy="2951185"/>
+            <a:off x="925361" y="1390735"/>
+            <a:ext cx="5942857" cy="3980952"/>
           </a:xfrm>
           <a:prstGeom prst="rect">
             <a:avLst/>
           </a:prstGeom>
         </p:spPr>
       </p:pic>
-      <p:sp>
-        <p:nvSpPr>
-          <p:cNvPr id="5" name="文本框 4">
-            <a:extLst>
-              <a:ext uri="{FF2B5EF4-FFF2-40B4-BE49-F238E27FC236}">
-                <a16:creationId xmlns:a16="http://schemas.microsoft.com/office/drawing/2014/main" id="{B6CEC18E-118F-4307-A415-9C274E748951}"/>
-              </a:ext>
-            </a:extLst>
-          </p:cNvPr>
-          <p:cNvSpPr txBox="1"/>
+      <p:pic>
+        <p:nvPicPr>
+          <p:cNvPr id="9" name="图片 8">
+            <a:extLst>
+              <a:ext uri="{FF2B5EF4-FFF2-40B4-BE49-F238E27FC236}">
+                <a16:creationId xmlns:a16="http://schemas.microsoft.com/office/drawing/2014/main" id="{051939B2-9465-4CEC-AEBA-8F90FC69FB9D}"/>
+              </a:ext>
+            </a:extLst>
+          </p:cNvPr>
+          <p:cNvPicPr>
+            <a:picLocks noChangeAspect="1"/>
+          </p:cNvPicPr>
           <p:nvPr/>
-        </p:nvSpPr>
+        </p:nvPicPr>
+        <p:blipFill>
+          <a:blip r:embed="rId3"/>
+          <a:stretch>
+            <a:fillRect/>
+          </a:stretch>
+        </p:blipFill>
         <p:spPr>
           <a:xfrm>
-            <a:off x="4405209" y="3200400"/>
-            <a:ext cx="1567737" cy="307777"/>
+            <a:off x="8009468" y="4326467"/>
+            <a:ext cx="2768448" cy="2015625"/>
           </a:xfrm>
           <a:prstGeom prst="rect">
             <a:avLst/>
           </a:prstGeom>
-          <a:noFill/>
         </p:spPr>
-        <p:txBody>
-          <a:bodyPr wrap="none" rtlCol="0">
-            <a:spAutoFit/>
-          </a:bodyPr>
-          <a:lstStyle/>
-          <a:p>
-            <a:pPr algn="l"/>
-            <a:r>
-              <a:rPr lang="en-US" altLang="zh-CN" sz="1400" dirty="0">
-                <a:latin typeface="微软雅黑" panose="020B0503020204020204" pitchFamily="34" charset="-122"/>
-                <a:ea typeface="微软雅黑" panose="020B0503020204020204" pitchFamily="34" charset="-122"/>
-              </a:rPr>
-              <a:t>Micro processor</a:t>
-            </a:r>
-            <a:endParaRPr lang="zh-CN" altLang="en-US" sz="1400" dirty="0">
-              <a:latin typeface="微软雅黑" panose="020B0503020204020204" pitchFamily="34" charset="-122"/>
-              <a:ea typeface="微软雅黑" panose="020B0503020204020204" pitchFamily="34" charset="-122"/>
-            </a:endParaRPr>
-          </a:p>
-        </p:txBody>
-      </p:sp>
-      <p:sp>
-        <p:nvSpPr>
-          <p:cNvPr id="6" name="文本框 5">
-            <a:extLst>
-              <a:ext uri="{FF2B5EF4-FFF2-40B4-BE49-F238E27FC236}">
-                <a16:creationId xmlns:a16="http://schemas.microsoft.com/office/drawing/2014/main" id="{C6BBF7A6-BDBC-4193-8E1B-F39FD71E4D63}"/>
+      </p:pic>
+      <p:sp>
+        <p:nvSpPr>
+          <p:cNvPr id="10" name="文本框 9">
+            <a:extLst>
+              <a:ext uri="{FF2B5EF4-FFF2-40B4-BE49-F238E27FC236}">
+                <a16:creationId xmlns:a16="http://schemas.microsoft.com/office/drawing/2014/main" id="{D5EFEFE5-17AA-4B17-A2B4-661B38B8458F}"/>
               </a:ext>
             </a:extLst>
           </p:cNvPr>
@@ -1284,132 +1955,7 @@
         </p:nvSpPr>
         <p:spPr>
           <a:xfrm>
-            <a:off x="1134533" y="4766733"/>
-            <a:ext cx="184731" cy="369332"/>
-          </a:xfrm>
-          <a:prstGeom prst="rect">
-            <a:avLst/>
-          </a:prstGeom>
-          <a:noFill/>
-        </p:spPr>
-        <p:txBody>
-          <a:bodyPr wrap="none" rtlCol="0">
-            <a:spAutoFit/>
-          </a:bodyPr>
-          <a:lstStyle/>
-          <a:p>
-            <a:pPr algn="l"/>
-            <a:endParaRPr lang="zh-CN" altLang="en-US" dirty="0">
-              <a:latin typeface="微软雅黑" panose="020B0503020204020204" pitchFamily="34" charset="-122"/>
-              <a:ea typeface="微软雅黑" panose="020B0503020204020204" pitchFamily="34" charset="-122"/>
-            </a:endParaRPr>
-          </a:p>
-        </p:txBody>
-      </p:sp>
-      <p:sp>
-        <p:nvSpPr>
-          <p:cNvPr id="8" name="文本框 7">
-            <a:extLst>
-              <a:ext uri="{FF2B5EF4-FFF2-40B4-BE49-F238E27FC236}">
-                <a16:creationId xmlns:a16="http://schemas.microsoft.com/office/drawing/2014/main" id="{FE499744-4FA8-4A2D-AC6F-71669539D026}"/>
-              </a:ext>
-            </a:extLst>
-          </p:cNvPr>
-          <p:cNvSpPr txBox="1"/>
-          <p:nvPr/>
-        </p:nvSpPr>
-        <p:spPr>
-          <a:xfrm>
-            <a:off x="365186" y="4660715"/>
-            <a:ext cx="11125200" cy="1920526"/>
-          </a:xfrm>
-          <a:prstGeom prst="rect">
-            <a:avLst/>
-          </a:prstGeom>
-          <a:noFill/>
-        </p:spPr>
-        <p:txBody>
-          <a:bodyPr wrap="square" rtlCol="0">
-            <a:spAutoFit/>
-          </a:bodyPr>
-          <a:lstStyle/>
-          <a:p>
-            <a:pPr marL="228600" indent="-228600">
-              <a:lnSpc>
-                <a:spcPct val="90000"/>
-              </a:lnSpc>
-              <a:spcBef>
-                <a:spcPts val="1000"/>
-              </a:spcBef>
-              <a:buFont typeface="Arial" panose="020B0604020202020204" pitchFamily="34" charset="0"/>
-              <a:buChar char="•"/>
-            </a:pPr>
-            <a:r>
-              <a:rPr lang="en-US" altLang="zh-CN" sz="2800" dirty="0">
-                <a:latin typeface="微软雅黑" panose="020B0503020204020204" pitchFamily="34" charset="-122"/>
-                <a:ea typeface="微软雅黑" panose="020B0503020204020204" pitchFamily="34" charset="-122"/>
-              </a:rPr>
-              <a:t>We show </a:t>
-            </a:r>
-            <a:r>
-              <a:rPr lang="en-US" altLang="zh-CN" sz="2800" dirty="0">
-                <a:solidFill>
-                  <a:srgbClr val="FF0000"/>
-                </a:solidFill>
-                <a:latin typeface="微软雅黑" panose="020B0503020204020204" pitchFamily="34" charset="-122"/>
-                <a:ea typeface="微软雅黑" panose="020B0503020204020204" pitchFamily="34" charset="-122"/>
-              </a:rPr>
-              <a:t>how</a:t>
-            </a:r>
-            <a:r>
-              <a:rPr lang="en-US" altLang="zh-CN" sz="2800" dirty="0">
-                <a:latin typeface="微软雅黑" panose="020B0503020204020204" pitchFamily="34" charset="-122"/>
-                <a:ea typeface="微软雅黑" panose="020B0503020204020204" pitchFamily="34" charset="-122"/>
-              </a:rPr>
-              <a:t> passive reservoir computing chips </a:t>
-            </a:r>
-            <a:r>
-              <a:rPr lang="en-US" altLang="zh-CN" sz="2800" dirty="0">
-                <a:solidFill>
-                  <a:srgbClr val="FF0000"/>
-                </a:solidFill>
-                <a:latin typeface="微软雅黑" panose="020B0503020204020204" pitchFamily="34" charset="-122"/>
-                <a:ea typeface="微软雅黑" panose="020B0503020204020204" pitchFamily="34" charset="-122"/>
-              </a:rPr>
-              <a:t>can be used </a:t>
-            </a:r>
-            <a:r>
-              <a:rPr lang="en-US" altLang="zh-CN" sz="2800" dirty="0">
-                <a:latin typeface="微软雅黑" panose="020B0503020204020204" pitchFamily="34" charset="-122"/>
-                <a:ea typeface="微软雅黑" panose="020B0503020204020204" pitchFamily="34" charset="-122"/>
-              </a:rPr>
-              <a:t>to perform a variety of tasks (bit level tasks, nonlinear dispersion compensation, etc.) at high speeds and low power consumption.</a:t>
-            </a:r>
-          </a:p>
-          <a:p>
-            <a:pPr algn="l"/>
-            <a:endParaRPr lang="zh-CN" altLang="en-US" dirty="0">
-              <a:latin typeface="微软雅黑" panose="020B0503020204020204" pitchFamily="34" charset="-122"/>
-              <a:ea typeface="微软雅黑" panose="020B0503020204020204" pitchFamily="34" charset="-122"/>
-            </a:endParaRPr>
-          </a:p>
-        </p:txBody>
-      </p:sp>
-      <p:sp>
-        <p:nvSpPr>
-          <p:cNvPr id="9" name="文本框 8">
-            <a:extLst>
-              <a:ext uri="{FF2B5EF4-FFF2-40B4-BE49-F238E27FC236}">
-                <a16:creationId xmlns:a16="http://schemas.microsoft.com/office/drawing/2014/main" id="{4E8E595D-FA49-494C-8514-C8C27C83689E}"/>
-              </a:ext>
-            </a:extLst>
-          </p:cNvPr>
-          <p:cNvSpPr txBox="1"/>
-          <p:nvPr/>
-        </p:nvSpPr>
-        <p:spPr>
-          <a:xfrm>
-            <a:off x="419067" y="4316692"/>
+            <a:off x="925361" y="6342092"/>
             <a:ext cx="5993892" cy="397032"/>
           </a:xfrm>
           <a:prstGeom prst="rect">
@@ -1436,21 +1982,35 @@
                 <a:latin typeface="微软雅黑" panose="020B0503020204020204" pitchFamily="34" charset="-122"/>
                 <a:ea typeface="微软雅黑" panose="020B0503020204020204" pitchFamily="34" charset="-122"/>
               </a:rPr>
-              <a:t>(</a:t>
+              <a:t>(Alessio </a:t>
             </a:r>
             <a:r>
               <a:rPr lang="en-US" altLang="zh-CN" sz="1100" dirty="0" err="1">
                 <a:latin typeface="微软雅黑" panose="020B0503020204020204" pitchFamily="34" charset="-122"/>
                 <a:ea typeface="微软雅黑" panose="020B0503020204020204" pitchFamily="34" charset="-122"/>
               </a:rPr>
-              <a:t>Katumba</a:t>
+              <a:t>Lugnan</a:t>
             </a:r>
             <a:r>
               <a:rPr lang="en-US" altLang="zh-CN" sz="1100" dirty="0">
                 <a:latin typeface="微软雅黑" panose="020B0503020204020204" pitchFamily="34" charset="-122"/>
                 <a:ea typeface="微软雅黑" panose="020B0503020204020204" pitchFamily="34" charset="-122"/>
               </a:rPr>
-              <a:t> et al., Neuromorphic Computing Based on Silicon Photonics and Reservoir Computing, IEEE Journal of Selected Topics in Quantum Electronics, 2018)</a:t>
+              <a:t> et al., Integrated pillar </a:t>
+            </a:r>
+            <a:r>
+              <a:rPr lang="en-US" altLang="zh-CN" sz="1100" dirty="0" err="1">
+                <a:latin typeface="微软雅黑" panose="020B0503020204020204" pitchFamily="34" charset="-122"/>
+                <a:ea typeface="微软雅黑" panose="020B0503020204020204" pitchFamily="34" charset="-122"/>
+              </a:rPr>
+              <a:t>scatterers</a:t>
+            </a:r>
+            <a:r>
+              <a:rPr lang="en-US" altLang="zh-CN" sz="1100" dirty="0">
+                <a:latin typeface="微软雅黑" panose="020B0503020204020204" pitchFamily="34" charset="-122"/>
+                <a:ea typeface="微软雅黑" panose="020B0503020204020204" pitchFamily="34" charset="-122"/>
+              </a:rPr>
+              <a:t> for speeding up classification of cell holograms, Optics Express, 2017)</a:t>
             </a:r>
             <a:endParaRPr lang="zh-CN" altLang="en-US" sz="1100" dirty="0">
               <a:latin typeface="微软雅黑" panose="020B0503020204020204" pitchFamily="34" charset="-122"/>
@@ -1459,10 +2019,74 @@
           </a:p>
         </p:txBody>
       </p:sp>
+      <p:sp>
+        <p:nvSpPr>
+          <p:cNvPr id="11" name="文本框 10">
+            <a:extLst>
+              <a:ext uri="{FF2B5EF4-FFF2-40B4-BE49-F238E27FC236}">
+                <a16:creationId xmlns:a16="http://schemas.microsoft.com/office/drawing/2014/main" id="{86A08FB9-2278-4E45-9762-52B17E042482}"/>
+              </a:ext>
+            </a:extLst>
+          </p:cNvPr>
+          <p:cNvSpPr txBox="1"/>
+          <p:nvPr/>
+        </p:nvSpPr>
+        <p:spPr>
+          <a:xfrm>
+            <a:off x="7512904" y="6325717"/>
+            <a:ext cx="3674533" cy="286232"/>
+          </a:xfrm>
+          <a:prstGeom prst="rect">
+            <a:avLst/>
+          </a:prstGeom>
+          <a:noFill/>
+        </p:spPr>
+        <p:txBody>
+          <a:bodyPr wrap="square" rtlCol="0">
+            <a:spAutoFit/>
+          </a:bodyPr>
+          <a:lstStyle/>
+          <a:p>
+            <a:pPr algn="l">
+              <a:lnSpc>
+                <a:spcPct val="90000"/>
+              </a:lnSpc>
+              <a:spcBef>
+                <a:spcPts val="1000"/>
+              </a:spcBef>
+            </a:pPr>
+            <a:r>
+              <a:rPr lang="en-US" altLang="zh-CN" sz="1400" dirty="0" err="1">
+                <a:latin typeface="微软雅黑" panose="020B0503020204020204" pitchFamily="34" charset="-122"/>
+                <a:ea typeface="微软雅黑" panose="020B0503020204020204" pitchFamily="34" charset="-122"/>
+              </a:rPr>
+              <a:t>generated“normal</a:t>
+            </a:r>
+            <a:r>
+              <a:rPr lang="en-US" altLang="zh-CN" sz="1400" dirty="0">
+                <a:latin typeface="微软雅黑" panose="020B0503020204020204" pitchFamily="34" charset="-122"/>
+                <a:ea typeface="微软雅黑" panose="020B0503020204020204" pitchFamily="34" charset="-122"/>
+              </a:rPr>
+              <a:t>” and “</a:t>
+            </a:r>
+            <a:r>
+              <a:rPr lang="en-US" altLang="zh-CN" sz="1400" dirty="0" err="1">
+                <a:latin typeface="微软雅黑" panose="020B0503020204020204" pitchFamily="34" charset="-122"/>
+                <a:ea typeface="微软雅黑" panose="020B0503020204020204" pitchFamily="34" charset="-122"/>
+              </a:rPr>
+              <a:t>cancer”cell</a:t>
+            </a:r>
+            <a:endParaRPr lang="zh-CN" altLang="en-US" sz="1200" dirty="0">
+              <a:latin typeface="微软雅黑" panose="020B0503020204020204" pitchFamily="34" charset="-122"/>
+              <a:ea typeface="微软雅黑" panose="020B0503020204020204" pitchFamily="34" charset="-122"/>
+            </a:endParaRPr>
+          </a:p>
+        </p:txBody>
+      </p:sp>
     </p:spTree>
     <p:extLst>
       <p:ext uri="{BB962C8B-B14F-4D97-AF65-F5344CB8AC3E}">
-        <p14:creationId xmlns:p14="http://schemas.microsoft.com/office/powerpoint/2010/main" val="2394345314"/>
+        <p14:creationId xmlns:p14="http://schemas.microsoft.com/office/powerpoint/2010/main" val="486421440"/>
       </p:ext>
     </p:extLst>
   </p:cSld>
@@ -1472,7 +2096,282 @@
 </p:sld>
 </file>
 
-<file path=ppt/slides/slide4.xml><?xml version="1.0" encoding="utf-8"?>
+<file path=ppt/slides/slide6.xml><?xml version="1.0" encoding="utf-8"?>
+<p:sld xmlns:a="http://schemas.openxmlformats.org/drawingml/2006/main" xmlns:r="http://schemas.openxmlformats.org/officeDocument/2006/relationships" xmlns:p="http://schemas.openxmlformats.org/presentationml/2006/main">
+  <p:cSld>
+    <p:spTree>
+      <p:nvGrpSpPr>
+        <p:cNvPr id="1" name=""/>
+        <p:cNvGrpSpPr/>
+        <p:nvPr/>
+      </p:nvGrpSpPr>
+      <p:grpSpPr>
+        <a:xfrm>
+          <a:off x="0" y="0"/>
+          <a:ext cx="0" cy="0"/>
+          <a:chOff x="0" y="0"/>
+          <a:chExt cx="0" cy="0"/>
+        </a:xfrm>
+      </p:grpSpPr>
+      <p:sp>
+        <p:nvSpPr>
+          <p:cNvPr id="2" name="内容占位符 1">
+            <a:extLst>
+              <a:ext uri="{FF2B5EF4-FFF2-40B4-BE49-F238E27FC236}">
+                <a16:creationId xmlns:a16="http://schemas.microsoft.com/office/drawing/2014/main" id="{7CE6E015-DC30-4299-9F98-21DA185BDE7C}"/>
+              </a:ext>
+            </a:extLst>
+          </p:cNvPr>
+          <p:cNvSpPr>
+            <a:spLocks noGrp="1"/>
+          </p:cNvSpPr>
+          <p:nvPr>
+            <p:ph idx="1"/>
+          </p:nvPr>
+        </p:nvSpPr>
+        <p:spPr>
+          <a:xfrm>
+            <a:off x="7264400" y="2641599"/>
+            <a:ext cx="4089400" cy="1574801"/>
+          </a:xfrm>
+        </p:spPr>
+        <p:txBody>
+          <a:bodyPr>
+            <a:normAutofit fontScale="92500"/>
+          </a:bodyPr>
+          <a:lstStyle/>
+          <a:p>
+            <a:r>
+              <a:rPr lang="en-US" altLang="zh-CN" sz="2400" dirty="0"/>
+              <a:t>a considerable error rate reduction</a:t>
+            </a:r>
+          </a:p>
+          <a:p>
+            <a:r>
+              <a:rPr lang="en-US" altLang="zh-CN" sz="2400" dirty="0"/>
+              <a:t>classification performance increase more than 50%</a:t>
+            </a:r>
+            <a:endParaRPr lang="zh-CN" altLang="en-US" sz="2400" dirty="0"/>
+          </a:p>
+        </p:txBody>
+      </p:sp>
+      <p:sp>
+        <p:nvSpPr>
+          <p:cNvPr id="3" name="标题 2">
+            <a:extLst>
+              <a:ext uri="{FF2B5EF4-FFF2-40B4-BE49-F238E27FC236}">
+                <a16:creationId xmlns:a16="http://schemas.microsoft.com/office/drawing/2014/main" id="{4EA37F63-CA49-4C05-8678-D84CA6C3F906}"/>
+              </a:ext>
+            </a:extLst>
+          </p:cNvPr>
+          <p:cNvSpPr>
+            <a:spLocks noGrp="1"/>
+          </p:cNvSpPr>
+          <p:nvPr>
+            <p:ph type="title"/>
+          </p:nvPr>
+        </p:nvSpPr>
+        <p:spPr/>
+        <p:txBody>
+          <a:bodyPr/>
+          <a:lstStyle/>
+          <a:p>
+            <a:r>
+              <a:rPr lang="en-US" altLang="zh-CN" dirty="0"/>
+              <a:t>Result</a:t>
+            </a:r>
+            <a:endParaRPr lang="zh-CN" altLang="en-US" dirty="0"/>
+          </a:p>
+        </p:txBody>
+      </p:sp>
+      <p:pic>
+        <p:nvPicPr>
+          <p:cNvPr id="4" name="图片 3">
+            <a:extLst>
+              <a:ext uri="{FF2B5EF4-FFF2-40B4-BE49-F238E27FC236}">
+                <a16:creationId xmlns:a16="http://schemas.microsoft.com/office/drawing/2014/main" id="{C2730461-DD51-46F4-91BB-B6C85991280C}"/>
+              </a:ext>
+            </a:extLst>
+          </p:cNvPr>
+          <p:cNvPicPr>
+            <a:picLocks noChangeAspect="1"/>
+          </p:cNvPicPr>
+          <p:nvPr/>
+        </p:nvPicPr>
+        <p:blipFill>
+          <a:blip r:embed="rId2"/>
+          <a:stretch>
+            <a:fillRect/>
+          </a:stretch>
+        </p:blipFill>
+        <p:spPr>
+          <a:xfrm>
+            <a:off x="838200" y="1510748"/>
+            <a:ext cx="6209524" cy="3171429"/>
+          </a:xfrm>
+          <a:prstGeom prst="rect">
+            <a:avLst/>
+          </a:prstGeom>
+        </p:spPr>
+      </p:pic>
+      <p:sp>
+        <p:nvSpPr>
+          <p:cNvPr id="6" name="文本框 5">
+            <a:extLst>
+              <a:ext uri="{FF2B5EF4-FFF2-40B4-BE49-F238E27FC236}">
+                <a16:creationId xmlns:a16="http://schemas.microsoft.com/office/drawing/2014/main" id="{1B7A97AC-5E6C-466A-9C1B-A31351A06B3B}"/>
+              </a:ext>
+            </a:extLst>
+          </p:cNvPr>
+          <p:cNvSpPr txBox="1"/>
+          <p:nvPr/>
+        </p:nvSpPr>
+        <p:spPr>
+          <a:xfrm>
+            <a:off x="1563828" y="4880959"/>
+            <a:ext cx="4758267" cy="646331"/>
+          </a:xfrm>
+          <a:prstGeom prst="rect">
+            <a:avLst/>
+          </a:prstGeom>
+          <a:noFill/>
+        </p:spPr>
+        <p:txBody>
+          <a:bodyPr wrap="square" rtlCol="0">
+            <a:spAutoFit/>
+          </a:bodyPr>
+          <a:lstStyle/>
+          <a:p>
+            <a:pPr algn="l">
+              <a:lnSpc>
+                <a:spcPct val="90000"/>
+              </a:lnSpc>
+              <a:spcBef>
+                <a:spcPts val="1000"/>
+              </a:spcBef>
+            </a:pPr>
+            <a:r>
+              <a:rPr lang="en-US" altLang="zh-CN" sz="2000" dirty="0">
+                <a:latin typeface="微软雅黑" panose="020B0503020204020204" pitchFamily="34" charset="-122"/>
+                <a:ea typeface="微软雅黑" panose="020B0503020204020204" pitchFamily="34" charset="-122"/>
+              </a:rPr>
+              <a:t>(4 layers, </a:t>
+            </a:r>
+            <a:r>
+              <a:rPr lang="en-US" altLang="zh-CN" sz="2000" dirty="0" err="1">
+                <a:latin typeface="微软雅黑" panose="020B0503020204020204" pitchFamily="34" charset="-122"/>
+                <a:ea typeface="微软雅黑" panose="020B0503020204020204" pitchFamily="34" charset="-122"/>
+              </a:rPr>
+              <a:t>Ar</a:t>
+            </a:r>
+            <a:r>
+              <a:rPr lang="en-US" altLang="zh-CN" sz="2000" dirty="0">
+                <a:latin typeface="微软雅黑" panose="020B0503020204020204" pitchFamily="34" charset="-122"/>
+                <a:ea typeface="微软雅黑" panose="020B0503020204020204" pitchFamily="34" charset="-122"/>
+              </a:rPr>
+              <a:t> = 150 nm, D = 2.85 um, UV (337.1 nm) laser source)</a:t>
+            </a:r>
+            <a:endParaRPr lang="zh-CN" altLang="en-US" sz="2000" dirty="0">
+              <a:latin typeface="微软雅黑" panose="020B0503020204020204" pitchFamily="34" charset="-122"/>
+              <a:ea typeface="微软雅黑" panose="020B0503020204020204" pitchFamily="34" charset="-122"/>
+            </a:endParaRPr>
+          </a:p>
+        </p:txBody>
+      </p:sp>
+    </p:spTree>
+    <p:extLst>
+      <p:ext uri="{BB962C8B-B14F-4D97-AF65-F5344CB8AC3E}">
+        <p14:creationId xmlns:p14="http://schemas.microsoft.com/office/powerpoint/2010/main" val="2319519095"/>
+      </p:ext>
+    </p:extLst>
+  </p:cSld>
+  <p:clrMapOvr>
+    <a:masterClrMapping/>
+  </p:clrMapOvr>
+</p:sld>
+</file>
+
+<file path=ppt/slides/slide7.xml><?xml version="1.0" encoding="utf-8"?>
+<p:sld xmlns:a="http://schemas.openxmlformats.org/drawingml/2006/main" xmlns:r="http://schemas.openxmlformats.org/officeDocument/2006/relationships" xmlns:p="http://schemas.openxmlformats.org/presentationml/2006/main">
+  <p:cSld>
+    <p:spTree>
+      <p:nvGrpSpPr>
+        <p:cNvPr id="1" name=""/>
+        <p:cNvGrpSpPr/>
+        <p:nvPr/>
+      </p:nvGrpSpPr>
+      <p:grpSpPr>
+        <a:xfrm>
+          <a:off x="0" y="0"/>
+          <a:ext cx="0" cy="0"/>
+          <a:chOff x="0" y="0"/>
+          <a:chExt cx="0" cy="0"/>
+        </a:xfrm>
+      </p:grpSpPr>
+      <p:sp>
+        <p:nvSpPr>
+          <p:cNvPr id="2" name="内容占位符 1">
+            <a:extLst>
+              <a:ext uri="{FF2B5EF4-FFF2-40B4-BE49-F238E27FC236}">
+                <a16:creationId xmlns:a16="http://schemas.microsoft.com/office/drawing/2014/main" id="{E6EE1639-43DE-4389-B645-792C5AC79AF4}"/>
+              </a:ext>
+            </a:extLst>
+          </p:cNvPr>
+          <p:cNvSpPr>
+            <a:spLocks noGrp="1"/>
+          </p:cNvSpPr>
+          <p:nvPr>
+            <p:ph idx="1"/>
+          </p:nvPr>
+        </p:nvSpPr>
+        <p:spPr/>
+        <p:txBody>
+          <a:bodyPr/>
+          <a:lstStyle/>
+          <a:p>
+            <a:endParaRPr lang="zh-CN" altLang="en-US" dirty="0"/>
+          </a:p>
+        </p:txBody>
+      </p:sp>
+      <p:sp>
+        <p:nvSpPr>
+          <p:cNvPr id="3" name="标题 2">
+            <a:extLst>
+              <a:ext uri="{FF2B5EF4-FFF2-40B4-BE49-F238E27FC236}">
+                <a16:creationId xmlns:a16="http://schemas.microsoft.com/office/drawing/2014/main" id="{6E25BF10-F01D-4C60-B6C1-EFB9D40EF8AE}"/>
+              </a:ext>
+            </a:extLst>
+          </p:cNvPr>
+          <p:cNvSpPr>
+            <a:spLocks noGrp="1"/>
+          </p:cNvSpPr>
+          <p:nvPr>
+            <p:ph type="title"/>
+          </p:nvPr>
+        </p:nvSpPr>
+        <p:spPr/>
+        <p:txBody>
+          <a:bodyPr/>
+          <a:lstStyle/>
+          <a:p>
+            <a:endParaRPr lang="zh-CN" altLang="en-US"/>
+          </a:p>
+        </p:txBody>
+      </p:sp>
+    </p:spTree>
+    <p:extLst>
+      <p:ext uri="{BB962C8B-B14F-4D97-AF65-F5344CB8AC3E}">
+        <p14:creationId xmlns:p14="http://schemas.microsoft.com/office/powerpoint/2010/main" val="793073273"/>
+      </p:ext>
+    </p:extLst>
+  </p:cSld>
+  <p:clrMapOvr>
+    <a:masterClrMapping/>
+  </p:clrMapOvr>
+</p:sld>
+</file>
+
+<file path=ppt/slides/slide8.xml><?xml version="1.0" encoding="utf-8"?>
 <p:sld xmlns:a="http://schemas.openxmlformats.org/drawingml/2006/main" xmlns:r="http://schemas.openxmlformats.org/officeDocument/2006/relationships" xmlns:p="http://schemas.openxmlformats.org/presentationml/2006/main">
   <p:cSld>
     <p:spTree>

</xml_diff>